<commit_message>
v^2 and |uv| solution found
v^2 and |uv| solution found, they're the same. No verification is done
on the |uv| solution. Also, propagation of the costate dynamics seems
not to work.
</commit_message>
<xml_diff>
--- a/Optimizing CubeSat Attitude Control.pptx
+++ b/Optimizing CubeSat Attitude Control.pptx
@@ -32,6 +32,7 @@
     <p:sldId id="280" r:id="rId26"/>
     <p:sldId id="281" r:id="rId27"/>
     <p:sldId id="282" r:id="rId28"/>
+    <p:sldId id="283" r:id="rId29"/>
   </p:sldIdLst>
   <p:sldSz cx="9144000" cy="6858000" type="screen4x3"/>
   <p:notesSz cx="6858000" cy="9144000"/>
@@ -314,7 +315,7 @@
           <a:p>
             <a:fld id="{F9F44960-9A6D-423A-9C30-645B9FA469C4}" type="datetimeFigureOut">
               <a:rPr lang="en-US" smtClean="0"/>
-              <a:t>6/2/2015</a:t>
+              <a:t>6/3/2015</a:t>
             </a:fld>
             <a:endParaRPr lang="en-US"/>
           </a:p>
@@ -484,7 +485,7 @@
           <a:p>
             <a:fld id="{F9F44960-9A6D-423A-9C30-645B9FA469C4}" type="datetimeFigureOut">
               <a:rPr lang="en-US" smtClean="0"/>
-              <a:t>6/2/2015</a:t>
+              <a:t>6/3/2015</a:t>
             </a:fld>
             <a:endParaRPr lang="en-US"/>
           </a:p>
@@ -664,7 +665,7 @@
           <a:p>
             <a:fld id="{F9F44960-9A6D-423A-9C30-645B9FA469C4}" type="datetimeFigureOut">
               <a:rPr lang="en-US" smtClean="0"/>
-              <a:t>6/2/2015</a:t>
+              <a:t>6/3/2015</a:t>
             </a:fld>
             <a:endParaRPr lang="en-US"/>
           </a:p>
@@ -834,7 +835,7 @@
           <a:p>
             <a:fld id="{F9F44960-9A6D-423A-9C30-645B9FA469C4}" type="datetimeFigureOut">
               <a:rPr lang="en-US" smtClean="0"/>
-              <a:t>6/2/2015</a:t>
+              <a:t>6/3/2015</a:t>
             </a:fld>
             <a:endParaRPr lang="en-US"/>
           </a:p>
@@ -1080,7 +1081,7 @@
           <a:p>
             <a:fld id="{F9F44960-9A6D-423A-9C30-645B9FA469C4}" type="datetimeFigureOut">
               <a:rPr lang="en-US" smtClean="0"/>
-              <a:t>6/2/2015</a:t>
+              <a:t>6/3/2015</a:t>
             </a:fld>
             <a:endParaRPr lang="en-US"/>
           </a:p>
@@ -1368,7 +1369,7 @@
           <a:p>
             <a:fld id="{F9F44960-9A6D-423A-9C30-645B9FA469C4}" type="datetimeFigureOut">
               <a:rPr lang="en-US" smtClean="0"/>
-              <a:t>6/2/2015</a:t>
+              <a:t>6/3/2015</a:t>
             </a:fld>
             <a:endParaRPr lang="en-US"/>
           </a:p>
@@ -1790,7 +1791,7 @@
           <a:p>
             <a:fld id="{F9F44960-9A6D-423A-9C30-645B9FA469C4}" type="datetimeFigureOut">
               <a:rPr lang="en-US" smtClean="0"/>
-              <a:t>6/2/2015</a:t>
+              <a:t>6/3/2015</a:t>
             </a:fld>
             <a:endParaRPr lang="en-US"/>
           </a:p>
@@ -1908,7 +1909,7 @@
           <a:p>
             <a:fld id="{F9F44960-9A6D-423A-9C30-645B9FA469C4}" type="datetimeFigureOut">
               <a:rPr lang="en-US" smtClean="0"/>
-              <a:t>6/2/2015</a:t>
+              <a:t>6/3/2015</a:t>
             </a:fld>
             <a:endParaRPr lang="en-US"/>
           </a:p>
@@ -2003,7 +2004,7 @@
           <a:p>
             <a:fld id="{F9F44960-9A6D-423A-9C30-645B9FA469C4}" type="datetimeFigureOut">
               <a:rPr lang="en-US" smtClean="0"/>
-              <a:t>6/2/2015</a:t>
+              <a:t>6/3/2015</a:t>
             </a:fld>
             <a:endParaRPr lang="en-US"/>
           </a:p>
@@ -2280,7 +2281,7 @@
           <a:p>
             <a:fld id="{F9F44960-9A6D-423A-9C30-645B9FA469C4}" type="datetimeFigureOut">
               <a:rPr lang="en-US" smtClean="0"/>
-              <a:t>6/2/2015</a:t>
+              <a:t>6/3/2015</a:t>
             </a:fld>
             <a:endParaRPr lang="en-US"/>
           </a:p>
@@ -2533,7 +2534,7 @@
           <a:p>
             <a:fld id="{F9F44960-9A6D-423A-9C30-645B9FA469C4}" type="datetimeFigureOut">
               <a:rPr lang="en-US" smtClean="0"/>
-              <a:t>6/2/2015</a:t>
+              <a:t>6/3/2015</a:t>
             </a:fld>
             <a:endParaRPr lang="en-US"/>
           </a:p>
@@ -2746,7 +2747,7 @@
           <a:p>
             <a:fld id="{F9F44960-9A6D-423A-9C30-645B9FA469C4}" type="datetimeFigureOut">
               <a:rPr lang="en-US" smtClean="0"/>
-              <a:t>6/2/2015</a:t>
+              <a:t>6/3/2015</a:t>
             </a:fld>
             <a:endParaRPr lang="en-US"/>
           </a:p>
@@ -3225,6 +3226,13 @@
   <p:clrMapOvr>
     <a:masterClrMapping/>
   </p:clrMapOvr>
+  <p:timing>
+    <p:tnLst>
+      <p:par>
+        <p:cTn id="1" dur="indefinite" restart="never" nodeType="tmRoot"/>
+      </p:par>
+    </p:tnLst>
+  </p:timing>
 </p:sld>
 </file>
 
@@ -3331,6 +3339,13 @@
   <p:clrMapOvr>
     <a:masterClrMapping/>
   </p:clrMapOvr>
+  <p:timing>
+    <p:tnLst>
+      <p:par>
+        <p:cTn id="1" dur="indefinite" restart="never" nodeType="tmRoot"/>
+      </p:par>
+    </p:tnLst>
+  </p:timing>
 </p:sld>
 </file>
 
@@ -3441,6 +3456,13 @@
   <p:clrMapOvr>
     <a:masterClrMapping/>
   </p:clrMapOvr>
+  <p:timing>
+    <p:tnLst>
+      <p:par>
+        <p:cTn id="1" dur="indefinite" restart="never" nodeType="tmRoot"/>
+      </p:par>
+    </p:tnLst>
+  </p:timing>
 </p:sld>
 </file>
 
@@ -3523,6 +3545,13 @@
   <p:clrMapOvr>
     <a:masterClrMapping/>
   </p:clrMapOvr>
+  <p:timing>
+    <p:tnLst>
+      <p:par>
+        <p:cTn id="1" dur="indefinite" restart="never" nodeType="tmRoot"/>
+      </p:par>
+    </p:tnLst>
+  </p:timing>
 </p:sld>
 </file>
 
@@ -3585,7 +3614,7 @@
           <a:p>
             <a:r>
               <a:rPr lang="en-US" dirty="0" smtClean="0"/>
-              <a:t>Analytical derivatives computed in </a:t>
+              <a:t>Analytical derivatives computed using </a:t>
             </a:r>
             <a:r>
               <a:rPr lang="en-US" dirty="0" err="1" smtClean="0"/>
@@ -3635,6 +3664,13 @@
   <p:clrMapOvr>
     <a:masterClrMapping/>
   </p:clrMapOvr>
+  <p:timing>
+    <p:tnLst>
+      <p:par>
+        <p:cTn id="1" dur="indefinite" restart="never" nodeType="tmRoot"/>
+      </p:par>
+    </p:tnLst>
+  </p:timing>
 </p:sld>
 </file>
 
@@ -3741,6 +3777,13 @@
   <p:clrMapOvr>
     <a:masterClrMapping/>
   </p:clrMapOvr>
+  <p:timing>
+    <p:tnLst>
+      <p:par>
+        <p:cTn id="1" dur="indefinite" restart="never" nodeType="tmRoot"/>
+      </p:par>
+    </p:tnLst>
+  </p:timing>
 </p:sld>
 </file>
 
@@ -3845,6 +3888,13 @@
   <p:clrMapOvr>
     <a:masterClrMapping/>
   </p:clrMapOvr>
+  <p:timing>
+    <p:tnLst>
+      <p:par>
+        <p:cTn id="1" dur="indefinite" restart="never" nodeType="tmRoot"/>
+      </p:par>
+    </p:tnLst>
+  </p:timing>
 </p:sld>
 </file>
 
@@ -3888,8 +3938,8 @@
           </a:p>
         </p:txBody>
       </p:sp>
-      <mc:AlternateContent xmlns:mc="http://schemas.openxmlformats.org/markup-compatibility/2006">
-        <mc:Choice xmlns:a14="http://schemas.microsoft.com/office/drawing/2010/main" Requires="a14">
+      <mc:AlternateContent xmlns:mc="http://schemas.openxmlformats.org/markup-compatibility/2006" xmlns:a14="http://schemas.microsoft.com/office/drawing/2010/main">
+        <mc:Choice Requires="a14">
           <p:sp>
             <p:nvSpPr>
               <p:cNvPr id="3" name="Content Placeholder 2"/>
@@ -4031,7 +4081,7 @@
             </p:txBody>
           </p:sp>
         </mc:Choice>
-        <mc:Fallback>
+        <mc:Fallback xmlns="">
           <p:sp>
             <p:nvSpPr>
               <p:cNvPr id="3" name="Content Placeholder 2"/>
@@ -4075,6 +4125,13 @@
   <p:clrMapOvr>
     <a:masterClrMapping/>
   </p:clrMapOvr>
+  <p:timing>
+    <p:tnLst>
+      <p:par>
+        <p:cTn id="1" dur="indefinite" restart="never" nodeType="tmRoot"/>
+      </p:par>
+    </p:tnLst>
+  </p:timing>
 </p:sld>
 </file>
 
@@ -4118,8 +4175,8 @@
           </a:p>
         </p:txBody>
       </p:sp>
-      <mc:AlternateContent xmlns:mc="http://schemas.openxmlformats.org/markup-compatibility/2006">
-        <mc:Choice xmlns:a14="http://schemas.microsoft.com/office/drawing/2010/main" Requires="a14">
+      <mc:AlternateContent xmlns:mc="http://schemas.openxmlformats.org/markup-compatibility/2006" xmlns:a14="http://schemas.microsoft.com/office/drawing/2010/main">
+        <mc:Choice Requires="a14">
           <p:sp>
             <p:nvSpPr>
               <p:cNvPr id="3" name="Content Placeholder 2"/>
@@ -4289,7 +4346,7 @@
             </p:txBody>
           </p:sp>
         </mc:Choice>
-        <mc:Fallback>
+        <mc:Fallback xmlns="">
           <p:sp>
             <p:nvSpPr>
               <p:cNvPr id="3" name="Content Placeholder 2"/>
@@ -4333,6 +4390,13 @@
   <p:clrMapOvr>
     <a:masterClrMapping/>
   </p:clrMapOvr>
+  <p:timing>
+    <p:tnLst>
+      <p:par>
+        <p:cTn id="1" dur="indefinite" restart="never" nodeType="tmRoot"/>
+      </p:par>
+    </p:tnLst>
+  </p:timing>
 </p:sld>
 </file>
 
@@ -4376,8 +4440,8 @@
           </a:p>
         </p:txBody>
       </p:sp>
-      <mc:AlternateContent xmlns:mc="http://schemas.openxmlformats.org/markup-compatibility/2006">
-        <mc:Choice xmlns:a14="http://schemas.microsoft.com/office/drawing/2010/main" Requires="a14">
+      <mc:AlternateContent xmlns:mc="http://schemas.openxmlformats.org/markup-compatibility/2006" xmlns:a14="http://schemas.microsoft.com/office/drawing/2010/main">
+        <mc:Choice Requires="a14">
           <p:sp>
             <p:nvSpPr>
               <p:cNvPr id="3" name="Content Placeholder 2"/>
@@ -4563,7 +4627,7 @@
             </p:txBody>
           </p:sp>
         </mc:Choice>
-        <mc:Fallback>
+        <mc:Fallback xmlns="">
           <p:sp>
             <p:nvSpPr>
               <p:cNvPr id="3" name="Content Placeholder 2"/>
@@ -4607,6 +4671,13 @@
   <p:clrMapOvr>
     <a:masterClrMapping/>
   </p:clrMapOvr>
+  <p:timing>
+    <p:tnLst>
+      <p:par>
+        <p:cTn id="1" dur="indefinite" restart="never" nodeType="tmRoot"/>
+      </p:par>
+    </p:tnLst>
+  </p:timing>
 </p:sld>
 </file>
 
@@ -4627,8 +4698,8 @@
           <a:chExt cx="0" cy="0"/>
         </a:xfrm>
       </p:grpSpPr>
-      <mc:AlternateContent xmlns:mc="http://schemas.openxmlformats.org/markup-compatibility/2006">
-        <mc:Choice xmlns:a14="http://schemas.microsoft.com/office/drawing/2010/main" Requires="a14">
+      <mc:AlternateContent xmlns:mc="http://schemas.openxmlformats.org/markup-compatibility/2006" xmlns:a14="http://schemas.microsoft.com/office/drawing/2010/main">
+        <mc:Choice Requires="a14">
           <p:sp>
             <p:nvSpPr>
               <p:cNvPr id="2" name="Title 1"/>
@@ -4738,7 +4809,7 @@
             </p:txBody>
           </p:sp>
         </mc:Choice>
-        <mc:Fallback>
+        <mc:Fallback xmlns="">
           <p:sp>
             <p:nvSpPr>
               <p:cNvPr id="2" name="Title 1"/>
@@ -4841,6 +4912,13 @@
   <p:clrMapOvr>
     <a:masterClrMapping/>
   </p:clrMapOvr>
+  <p:timing>
+    <p:tnLst>
+      <p:par>
+        <p:cTn id="1" dur="indefinite" restart="never" nodeType="tmRoot"/>
+      </p:par>
+    </p:tnLst>
+  </p:timing>
 </p:sld>
 </file>
 
@@ -4978,6 +5056,13 @@
   <p:clrMapOvr>
     <a:masterClrMapping/>
   </p:clrMapOvr>
+  <p:timing>
+    <p:tnLst>
+      <p:par>
+        <p:cTn id="1" dur="indefinite" restart="never" nodeType="tmRoot"/>
+      </p:par>
+    </p:tnLst>
+  </p:timing>
 </p:sld>
 </file>
 
@@ -5021,8 +5106,8 @@
           </a:p>
         </p:txBody>
       </p:sp>
-      <mc:AlternateContent xmlns:mc="http://schemas.openxmlformats.org/markup-compatibility/2006">
-        <mc:Choice xmlns:a14="http://schemas.microsoft.com/office/drawing/2010/main" Requires="a14">
+      <mc:AlternateContent xmlns:mc="http://schemas.openxmlformats.org/markup-compatibility/2006" xmlns:a14="http://schemas.microsoft.com/office/drawing/2010/main">
+        <mc:Choice Requires="a14">
           <p:sp>
             <p:nvSpPr>
               <p:cNvPr id="3" name="Content Placeholder 2"/>
@@ -5110,7 +5195,7 @@
             </p:txBody>
           </p:sp>
         </mc:Choice>
-        <mc:Fallback>
+        <mc:Fallback xmlns="">
           <p:sp>
             <p:nvSpPr>
               <p:cNvPr id="3" name="Content Placeholder 2"/>
@@ -5154,6 +5239,13 @@
   <p:clrMapOvr>
     <a:masterClrMapping/>
   </p:clrMapOvr>
+  <p:timing>
+    <p:tnLst>
+      <p:par>
+        <p:cTn id="1" dur="indefinite" restart="never" nodeType="tmRoot"/>
+      </p:par>
+    </p:tnLst>
+  </p:timing>
 </p:sld>
 </file>
 
@@ -5174,8 +5266,8 @@
           <a:chExt cx="0" cy="0"/>
         </a:xfrm>
       </p:grpSpPr>
-      <mc:AlternateContent xmlns:mc="http://schemas.openxmlformats.org/markup-compatibility/2006">
-        <mc:Choice xmlns:a14="http://schemas.microsoft.com/office/drawing/2010/main" Requires="a14">
+      <mc:AlternateContent xmlns:mc="http://schemas.openxmlformats.org/markup-compatibility/2006" xmlns:a14="http://schemas.microsoft.com/office/drawing/2010/main">
+        <mc:Choice Requires="a14">
           <p:sp>
             <p:nvSpPr>
               <p:cNvPr id="2" name="Title 1"/>
@@ -5259,7 +5351,7 @@
             </p:txBody>
           </p:sp>
         </mc:Choice>
-        <mc:Fallback>
+        <mc:Fallback xmlns="">
           <p:sp>
             <p:nvSpPr>
               <p:cNvPr id="2" name="Title 1"/>
@@ -5332,6 +5424,13 @@
   <p:clrMapOvr>
     <a:masterClrMapping/>
   </p:clrMapOvr>
+  <p:timing>
+    <p:tnLst>
+      <p:par>
+        <p:cTn id="1" dur="indefinite" restart="never" nodeType="tmRoot"/>
+      </p:par>
+    </p:tnLst>
+  </p:timing>
 </p:sld>
 </file>
 
@@ -5414,6 +5513,13 @@
   <p:clrMapOvr>
     <a:masterClrMapping/>
   </p:clrMapOvr>
+  <p:timing>
+    <p:tnLst>
+      <p:par>
+        <p:cTn id="1" dur="indefinite" restart="never" nodeType="tmRoot"/>
+      </p:par>
+    </p:tnLst>
+  </p:timing>
 </p:sld>
 </file>
 
@@ -5496,6 +5602,13 @@
   <p:clrMapOvr>
     <a:masterClrMapping/>
   </p:clrMapOvr>
+  <p:timing>
+    <p:tnLst>
+      <p:par>
+        <p:cTn id="1" dur="indefinite" restart="never" nodeType="tmRoot"/>
+      </p:par>
+    </p:tnLst>
+  </p:timing>
 </p:sld>
 </file>
 
@@ -5578,6 +5691,13 @@
   <p:clrMapOvr>
     <a:masterClrMapping/>
   </p:clrMapOvr>
+  <p:timing>
+    <p:tnLst>
+      <p:par>
+        <p:cTn id="1" dur="indefinite" restart="never" nodeType="tmRoot"/>
+      </p:par>
+    </p:tnLst>
+  </p:timing>
 </p:sld>
 </file>
 
@@ -5660,6 +5780,13 @@
   <p:clrMapOvr>
     <a:masterClrMapping/>
   </p:clrMapOvr>
+  <p:timing>
+    <p:tnLst>
+      <p:par>
+        <p:cTn id="1" dur="indefinite" restart="never" nodeType="tmRoot"/>
+      </p:par>
+    </p:tnLst>
+  </p:timing>
 </p:sld>
 </file>
 
@@ -5703,8 +5830,8 @@
           </a:p>
         </p:txBody>
       </p:sp>
-      <mc:AlternateContent xmlns:mc="http://schemas.openxmlformats.org/markup-compatibility/2006">
-        <mc:Choice xmlns:a14="http://schemas.microsoft.com/office/drawing/2010/main" Requires="a14">
+      <mc:AlternateContent xmlns:mc="http://schemas.openxmlformats.org/markup-compatibility/2006" xmlns:a14="http://schemas.microsoft.com/office/drawing/2010/main">
+        <mc:Choice Requires="a14">
           <p:sp>
             <p:nvSpPr>
               <p:cNvPr id="3" name="Content Placeholder 2"/>
@@ -5818,12 +5945,11 @@
                   <a:rPr lang="en-US" dirty="0" smtClean="0"/>
                   <a:t> </a:t>
                 </a:r>
-                <a:endParaRPr lang="en-US" dirty="0" smtClean="0"/>
               </a:p>
             </p:txBody>
           </p:sp>
         </mc:Choice>
-        <mc:Fallback>
+        <mc:Fallback xmlns="">
           <p:sp>
             <p:nvSpPr>
               <p:cNvPr id="3" name="Content Placeholder 2"/>
@@ -5867,6 +5993,13 @@
   <p:clrMapOvr>
     <a:masterClrMapping/>
   </p:clrMapOvr>
+  <p:timing>
+    <p:tnLst>
+      <p:par>
+        <p:cTn id="1" dur="indefinite" restart="never" nodeType="tmRoot"/>
+      </p:par>
+    </p:tnLst>
+  </p:timing>
 </p:sld>
 </file>
 
@@ -5904,14 +6037,14 @@
           <a:p>
             <a:r>
               <a:rPr lang="en-US" dirty="0" smtClean="0"/>
-              <a:t>Hypothesis</a:t>
+              <a:t>Discussion</a:t>
             </a:r>
             <a:endParaRPr lang="en-US" dirty="0"/>
           </a:p>
         </p:txBody>
       </p:sp>
-      <mc:AlternateContent xmlns:mc="http://schemas.openxmlformats.org/markup-compatibility/2006">
-        <mc:Choice xmlns:a14="http://schemas.microsoft.com/office/drawing/2010/main" Requires="a14">
+      <mc:AlternateContent xmlns:mc="http://schemas.openxmlformats.org/markup-compatibility/2006" xmlns:a14="http://schemas.microsoft.com/office/drawing/2010/main">
+        <mc:Choice Requires="a14">
           <p:sp>
             <p:nvSpPr>
               <p:cNvPr id="3" name="Content Placeholder 2"/>
@@ -5929,7 +6062,18 @@
               <a:p>
                 <a:r>
                   <a:rPr lang="en-US" dirty="0" smtClean="0"/>
-                  <a:t>Hypothesis: the  bang-off-bang solution we got for </a:t>
+                  <a:t>In one dimension, this control:</a:t>
+                </a:r>
+              </a:p>
+              <a:p>
+                <a:pPr lvl="1"/>
+                <a:r>
+                  <a:rPr lang="en-US" dirty="0"/>
+                  <a:t>O</a:t>
+                </a:r>
+                <a:r>
+                  <a:rPr lang="en-US" dirty="0" smtClean="0"/>
+                  <a:t>ptimizes </a:t>
                 </a:r>
                 <a14:m>
                   <m:oMath xmlns:m="http://schemas.openxmlformats.org/officeDocument/2006/math">
@@ -5939,7 +6083,7 @@
                         <m:subHide m:val="on"/>
                         <m:supHide m:val="on"/>
                         <m:ctrlPr>
-                          <a:rPr lang="en-US" i="1" smtClean="0">
+                          <a:rPr lang="en-US" i="1">
                             <a:latin typeface="Cambria Math"/>
                           </a:rPr>
                         </m:ctrlPr>
@@ -5947,34 +6091,83 @@
                       <m:sub/>
                       <m:sup/>
                       <m:e>
-                        <m:sSup>
-                          <m:sSupPr>
-                            <m:ctrlPr>
-                              <a:rPr lang="en-US" i="1" smtClean="0">
-                                <a:latin typeface="Cambria Math"/>
-                              </a:rPr>
-                            </m:ctrlPr>
-                          </m:sSupPr>
-                          <m:e>
-                            <m:r>
-                              <a:rPr lang="en-US" b="0" i="1" smtClean="0">
-                                <a:latin typeface="Cambria Math"/>
-                                <a:ea typeface="Cambria Math"/>
-                              </a:rPr>
-                              <m:t>𝜔</m:t>
-                            </m:r>
-                          </m:e>
-                          <m:sup>
-                            <m:r>
-                              <a:rPr lang="en-US" b="0" i="1" smtClean="0">
-                                <a:latin typeface="Cambria Math"/>
-                              </a:rPr>
-                              <m:t>2</m:t>
-                            </m:r>
-                          </m:sup>
-                        </m:sSup>
                         <m:r>
-                          <a:rPr lang="en-US" b="0" i="1" smtClean="0">
+                          <a:rPr lang="en-US" i="1">
+                            <a:latin typeface="Cambria Math"/>
+                          </a:rPr>
+                          <m:t>|</m:t>
+                        </m:r>
+                        <m:r>
+                          <a:rPr lang="en-US" i="1">
+                            <a:latin typeface="Cambria Math"/>
+                            <a:ea typeface="Cambria Math"/>
+                          </a:rPr>
+                          <m:t>𝛼</m:t>
+                        </m:r>
+                        <m:r>
+                          <a:rPr lang="en-US" i="1">
+                            <a:latin typeface="Cambria Math"/>
+                            <a:ea typeface="Cambria Math"/>
+                          </a:rPr>
+                          <m:t>|</m:t>
+                        </m:r>
+                        <m:r>
+                          <a:rPr lang="en-US" i="1">
+                            <a:latin typeface="Cambria Math"/>
+                            <a:ea typeface="Cambria Math"/>
+                          </a:rPr>
+                          <m:t>𝑑𝑡</m:t>
+                        </m:r>
+                      </m:e>
+                    </m:nary>
+                  </m:oMath>
+                </a14:m>
+                <a:endParaRPr lang="en-US" dirty="0" smtClean="0"/>
+              </a:p>
+              <a:p>
+                <a:pPr lvl="1"/>
+                <a:r>
+                  <a:rPr lang="en-US" dirty="0" smtClean="0"/>
+                  <a:t>It also optimizes </a:t>
+                </a:r>
+                <a14:m>
+                  <m:oMath xmlns:m="http://schemas.openxmlformats.org/officeDocument/2006/math">
+                    <m:nary>
+                      <m:naryPr>
+                        <m:limLoc m:val="undOvr"/>
+                        <m:subHide m:val="on"/>
+                        <m:supHide m:val="on"/>
+                        <m:ctrlPr>
+                          <a:rPr lang="en-US" i="1">
+                            <a:latin typeface="Cambria Math"/>
+                          </a:rPr>
+                        </m:ctrlPr>
+                      </m:naryPr>
+                      <m:sub/>
+                      <m:sup/>
+                      <m:e>
+                        <m:r>
+                          <a:rPr lang="en-US" i="1">
+                            <a:latin typeface="Cambria Math"/>
+                          </a:rPr>
+                          <m:t>|</m:t>
+                        </m:r>
+                        <m:r>
+                          <a:rPr lang="en-US" i="1">
+                            <a:latin typeface="Cambria Math"/>
+                            <a:ea typeface="Cambria Math"/>
+                          </a:rPr>
+                          <m:t>𝜔</m:t>
+                        </m:r>
+                        <m:r>
+                          <a:rPr lang="en-US" i="1">
+                            <a:latin typeface="Cambria Math"/>
+                            <a:ea typeface="Cambria Math"/>
+                          </a:rPr>
+                          <m:t>|</m:t>
+                        </m:r>
+                        <m:r>
+                          <a:rPr lang="en-US" i="1">
                             <a:latin typeface="Cambria Math"/>
                             <a:ea typeface="Cambria Math"/>
                           </a:rPr>
@@ -5986,7 +6179,13 @@
                 </a14:m>
                 <a:r>
                   <a:rPr lang="en-US" dirty="0" smtClean="0"/>
-                  <a:t> is also optimal for </a:t>
+                  <a:t> because each wheel only ever spins in one direction</a:t>
+                </a:r>
+              </a:p>
+              <a:p>
+                <a:r>
+                  <a:rPr lang="en-US" dirty="0" smtClean="0"/>
+                  <a:t>How to check / prove if the  solution optimizes </a:t>
                 </a:r>
                 <a14:m>
                   <m:oMath xmlns:m="http://schemas.openxmlformats.org/officeDocument/2006/math">
@@ -5996,7 +6195,7 @@
                         <m:subHide m:val="on"/>
                         <m:supHide m:val="on"/>
                         <m:ctrlPr>
-                          <a:rPr lang="en-US" i="1" smtClean="0">
+                          <a:rPr lang="en-US" i="1">
                             <a:latin typeface="Cambria Math"/>
                           </a:rPr>
                         </m:ctrlPr>
@@ -6005,27 +6204,27 @@
                       <m:sup/>
                       <m:e>
                         <m:r>
-                          <a:rPr lang="en-US" b="0" i="1" smtClean="0">
+                          <a:rPr lang="en-US" i="1">
                             <a:latin typeface="Cambria Math"/>
                           </a:rPr>
                           <m:t>|</m:t>
                         </m:r>
                         <m:r>
-                          <a:rPr lang="en-US" b="0" i="1" smtClean="0">
+                          <a:rPr lang="en-US" i="1">
                             <a:latin typeface="Cambria Math"/>
                             <a:ea typeface="Cambria Math"/>
                           </a:rPr>
                           <m:t>𝛼𝜔</m:t>
                         </m:r>
                         <m:r>
-                          <a:rPr lang="en-US" b="0" i="1" smtClean="0">
+                          <a:rPr lang="en-US" i="1">
                             <a:latin typeface="Cambria Math"/>
                             <a:ea typeface="Cambria Math"/>
                           </a:rPr>
                           <m:t>|</m:t>
                         </m:r>
                         <m:r>
-                          <a:rPr lang="en-US" b="0" i="1" smtClean="0">
+                          <a:rPr lang="en-US" i="1">
                             <a:latin typeface="Cambria Math"/>
                             <a:ea typeface="Cambria Math"/>
                           </a:rPr>
@@ -6037,17 +6236,97 @@
                 </a14:m>
                 <a:r>
                   <a:rPr lang="en-US" dirty="0" smtClean="0"/>
-                  <a:t> </a:t>
+                  <a:t>?</a:t>
                 </a:r>
               </a:p>
               <a:p>
-                <a:endParaRPr lang="en-US" dirty="0" smtClean="0"/>
-              </a:p>
-              <a:p>
-                <a:pPr marL="457200" lvl="1" indent="0">
-                  <a:buNone/>
-                </a:pPr>
-                <a:endParaRPr lang="en-US" dirty="0" smtClean="0"/>
+                <a:r>
+                  <a:rPr lang="en-US" dirty="0" smtClean="0"/>
+                  <a:t>Why doesn’t DIDO work well for </a:t>
+                </a:r>
+                <a14:m>
+                  <m:oMath xmlns:m="http://schemas.openxmlformats.org/officeDocument/2006/math">
+                    <m:nary>
+                      <m:naryPr>
+                        <m:limLoc m:val="undOvr"/>
+                        <m:subHide m:val="on"/>
+                        <m:supHide m:val="on"/>
+                        <m:ctrlPr>
+                          <a:rPr lang="en-US" i="1">
+                            <a:latin typeface="Cambria Math"/>
+                          </a:rPr>
+                        </m:ctrlPr>
+                      </m:naryPr>
+                      <m:sub/>
+                      <m:sup/>
+                      <m:e>
+                        <m:sSup>
+                          <m:sSupPr>
+                            <m:ctrlPr>
+                              <a:rPr lang="en-US" i="1">
+                                <a:latin typeface="Cambria Math"/>
+                              </a:rPr>
+                            </m:ctrlPr>
+                          </m:sSupPr>
+                          <m:e>
+                            <m:r>
+                              <a:rPr lang="en-US" i="1">
+                                <a:latin typeface="Cambria Math"/>
+                                <a:ea typeface="Cambria Math"/>
+                              </a:rPr>
+                              <m:t>𝛼</m:t>
+                            </m:r>
+                          </m:e>
+                          <m:sup>
+                            <m:r>
+                              <a:rPr lang="en-US" i="1">
+                                <a:latin typeface="Cambria Math"/>
+                              </a:rPr>
+                              <m:t>2</m:t>
+                            </m:r>
+                          </m:sup>
+                        </m:sSup>
+                        <m:sSup>
+                          <m:sSupPr>
+                            <m:ctrlPr>
+                              <a:rPr lang="en-US" i="1">
+                                <a:latin typeface="Cambria Math"/>
+                              </a:rPr>
+                            </m:ctrlPr>
+                          </m:sSupPr>
+                          <m:e>
+                            <m:r>
+                              <a:rPr lang="en-US" i="1">
+                                <a:latin typeface="Cambria Math"/>
+                                <a:ea typeface="Cambria Math"/>
+                              </a:rPr>
+                              <m:t>𝜔</m:t>
+                            </m:r>
+                          </m:e>
+                          <m:sup>
+                            <m:r>
+                              <a:rPr lang="en-US" i="1">
+                                <a:latin typeface="Cambria Math"/>
+                              </a:rPr>
+                              <m:t>2</m:t>
+                            </m:r>
+                          </m:sup>
+                        </m:sSup>
+                        <m:r>
+                          <a:rPr lang="en-US" i="1">
+                            <a:latin typeface="Cambria Math"/>
+                            <a:ea typeface="Cambria Math"/>
+                          </a:rPr>
+                          <m:t>𝑑𝑡</m:t>
+                        </m:r>
+                      </m:e>
+                    </m:nary>
+                  </m:oMath>
+                </a14:m>
+                <a:r>
+                  <a:rPr lang="en-US" dirty="0" smtClean="0"/>
+                  <a:t> cost function? </a:t>
+                </a:r>
               </a:p>
               <a:p>
                 <a:endParaRPr lang="en-US" dirty="0" smtClean="0"/>
@@ -6061,7 +6340,7 @@
             </p:txBody>
           </p:sp>
         </mc:Choice>
-        <mc:Fallback>
+        <mc:Fallback xmlns="">
           <p:sp>
             <p:nvSpPr>
               <p:cNvPr id="3" name="Content Placeholder 2"/>
@@ -6076,7 +6355,7 @@
               <a:blipFill rotWithShape="1">
                 <a:blip r:embed="rId2"/>
                 <a:stretch>
-                  <a:fillRect l="-1630" t="-1752"/>
+                  <a:fillRect l="-1630" t="-1752" r="-2593" b="-3908"/>
                 </a:stretch>
               </a:blipFill>
             </p:spPr>
@@ -6105,6 +6384,117 @@
   <p:clrMapOvr>
     <a:masterClrMapping/>
   </p:clrMapOvr>
+  <p:timing>
+    <p:tnLst>
+      <p:par>
+        <p:cTn id="1" dur="indefinite" restart="never" nodeType="tmRoot"/>
+      </p:par>
+    </p:tnLst>
+  </p:timing>
+</p:sld>
+</file>
+
+<file path=ppt/slides/slide28.xml><?xml version="1.0" encoding="utf-8"?>
+<p:sld xmlns:a="http://schemas.openxmlformats.org/drawingml/2006/main" xmlns:r="http://schemas.openxmlformats.org/officeDocument/2006/relationships" xmlns:p="http://schemas.openxmlformats.org/presentationml/2006/main">
+  <p:cSld>
+    <p:spTree>
+      <p:nvGrpSpPr>
+        <p:cNvPr id="1" name=""/>
+        <p:cNvGrpSpPr/>
+        <p:nvPr/>
+      </p:nvGrpSpPr>
+      <p:grpSpPr>
+        <a:xfrm>
+          <a:off x="0" y="0"/>
+          <a:ext cx="0" cy="0"/>
+          <a:chOff x="0" y="0"/>
+          <a:chExt cx="0" cy="0"/>
+        </a:xfrm>
+      </p:grpSpPr>
+      <p:sp>
+        <p:nvSpPr>
+          <p:cNvPr id="2" name="Title 1"/>
+          <p:cNvSpPr>
+            <a:spLocks noGrp="1"/>
+          </p:cNvSpPr>
+          <p:nvPr>
+            <p:ph type="title"/>
+          </p:nvPr>
+        </p:nvSpPr>
+        <p:spPr/>
+        <p:txBody>
+          <a:bodyPr/>
+          <a:lstStyle/>
+          <a:p>
+            <a:r>
+              <a:rPr lang="en-US" dirty="0" smtClean="0"/>
+              <a:t>To Do</a:t>
+            </a:r>
+            <a:endParaRPr lang="en-US" dirty="0"/>
+          </a:p>
+        </p:txBody>
+      </p:sp>
+      <p:sp>
+        <p:nvSpPr>
+          <p:cNvPr id="3" name="Content Placeholder 2"/>
+          <p:cNvSpPr>
+            <a:spLocks noGrp="1"/>
+          </p:cNvSpPr>
+          <p:nvPr>
+            <p:ph idx="1"/>
+          </p:nvPr>
+        </p:nvSpPr>
+        <p:spPr/>
+        <p:txBody>
+          <a:bodyPr/>
+          <a:lstStyle/>
+          <a:p>
+            <a:r>
+              <a:rPr lang="en-US" dirty="0" smtClean="0"/>
+              <a:t>Optimize 3U </a:t>
+            </a:r>
+            <a:r>
+              <a:rPr lang="en-US" dirty="0" err="1" smtClean="0"/>
+              <a:t>CubeSat</a:t>
+            </a:r>
+            <a:r>
+              <a:rPr lang="en-US" dirty="0" smtClean="0"/>
+              <a:t> trajectories (30x10x10 cm)</a:t>
+            </a:r>
+          </a:p>
+          <a:p>
+            <a:pPr lvl="1"/>
+            <a:r>
+              <a:rPr lang="en-US" dirty="0" smtClean="0"/>
+              <a:t>More likely to have this kind of controller</a:t>
+            </a:r>
+          </a:p>
+          <a:p>
+            <a:r>
+              <a:rPr lang="en-US" dirty="0" smtClean="0"/>
+              <a:t>Suggestions?</a:t>
+            </a:r>
+            <a:endParaRPr lang="en-US" dirty="0"/>
+          </a:p>
+        </p:txBody>
+      </p:sp>
+    </p:spTree>
+    <p:extLst>
+      <p:ext uri="{BB962C8B-B14F-4D97-AF65-F5344CB8AC3E}">
+        <p14:creationId xmlns:p14="http://schemas.microsoft.com/office/powerpoint/2010/main" val="2559380786"/>
+      </p:ext>
+    </p:extLst>
+  </p:cSld>
+  <p:clrMapOvr>
+    <a:masterClrMapping/>
+  </p:clrMapOvr>
+  <p:timing>
+    <p:tnLst>
+      <p:par>
+        <p:cTn id="1" dur="indefinite" restart="never" nodeType="tmRoot"/>
+      </p:par>
+    </p:tnLst>
+  </p:timing>
 </p:sld>
 </file>
 
@@ -6187,6 +6577,13 @@
   <p:clrMapOvr>
     <a:masterClrMapping/>
   </p:clrMapOvr>
+  <p:timing>
+    <p:tnLst>
+      <p:par>
+        <p:cTn id="1" dur="indefinite" restart="never" nodeType="tmRoot"/>
+      </p:par>
+    </p:tnLst>
+  </p:timing>
 </p:sld>
 </file>
 
@@ -6275,6 +6672,13 @@
   <p:clrMapOvr>
     <a:masterClrMapping/>
   </p:clrMapOvr>
+  <p:timing>
+    <p:tnLst>
+      <p:par>
+        <p:cTn id="1" dur="indefinite" restart="never" nodeType="tmRoot"/>
+      </p:par>
+    </p:tnLst>
+  </p:timing>
 </p:sld>
 </file>
 
@@ -6376,6 +6780,13 @@
   <p:clrMapOvr>
     <a:masterClrMapping/>
   </p:clrMapOvr>
+  <p:timing>
+    <p:tnLst>
+      <p:par>
+        <p:cTn id="1" dur="indefinite" restart="never" nodeType="tmRoot"/>
+      </p:par>
+    </p:tnLst>
+  </p:timing>
 </p:sld>
 </file>
 
@@ -6526,6 +6937,13 @@
   <p:clrMapOvr>
     <a:masterClrMapping/>
   </p:clrMapOvr>
+  <p:timing>
+    <p:tnLst>
+      <p:par>
+        <p:cTn id="1" dur="indefinite" restart="never" nodeType="tmRoot"/>
+      </p:par>
+    </p:tnLst>
+  </p:timing>
 </p:sld>
 </file>
 
@@ -6628,6 +7046,13 @@
   <p:clrMapOvr>
     <a:masterClrMapping/>
   </p:clrMapOvr>
+  <p:timing>
+    <p:tnLst>
+      <p:par>
+        <p:cTn id="1" dur="indefinite" restart="never" nodeType="tmRoot"/>
+      </p:par>
+    </p:tnLst>
+  </p:timing>
 </p:sld>
 </file>
 
@@ -6759,6 +7184,13 @@
   <p:clrMapOvr>
     <a:masterClrMapping/>
   </p:clrMapOvr>
+  <p:timing>
+    <p:tnLst>
+      <p:par>
+        <p:cTn id="1" dur="indefinite" restart="never" nodeType="tmRoot"/>
+      </p:par>
+    </p:tnLst>
+  </p:timing>
 </p:sld>
 </file>
 
@@ -6843,6 +7275,13 @@
   <p:clrMapOvr>
     <a:masterClrMapping/>
   </p:clrMapOvr>
+  <p:timing>
+    <p:tnLst>
+      <p:par>
+        <p:cTn id="1" dur="indefinite" restart="never" nodeType="tmRoot"/>
+      </p:par>
+    </p:tnLst>
+  </p:timing>
 </p:sld>
 </file>
 

</xml_diff>